<commit_message>
bild av förvarets tillsätts
jätte god
</commit_message>
<xml_diff>
--- a/Versionskontroll med Nalle Wahlroos.pptx
+++ b/Versionskontroll med Nalle Wahlroos.pptx
@@ -344,7 +344,7 @@
           <a:p>
             <a:fld id="{755046C0-CD55-4C47-BE07-7B297E1EF784}" type="datetimeFigureOut">
               <a:rPr lang="fi-FI" smtClean="0"/>
-              <a:t>10.4.2016</a:t>
+              <a:t>11.4.2016</a:t>
             </a:fld>
             <a:endParaRPr lang="fi-FI"/>
           </a:p>
@@ -552,7 +552,7 @@
           <a:p>
             <a:fld id="{755046C0-CD55-4C47-BE07-7B297E1EF784}" type="datetimeFigureOut">
               <a:rPr lang="fi-FI" smtClean="0"/>
-              <a:t>10.4.2016</a:t>
+              <a:t>11.4.2016</a:t>
             </a:fld>
             <a:endParaRPr lang="fi-FI"/>
           </a:p>
@@ -808,7 +808,7 @@
           <a:p>
             <a:fld id="{755046C0-CD55-4C47-BE07-7B297E1EF784}" type="datetimeFigureOut">
               <a:rPr lang="fi-FI" smtClean="0"/>
-              <a:t>10.4.2016</a:t>
+              <a:t>11.4.2016</a:t>
             </a:fld>
             <a:endParaRPr lang="fi-FI"/>
           </a:p>
@@ -982,7 +982,7 @@
           <a:p>
             <a:fld id="{755046C0-CD55-4C47-BE07-7B297E1EF784}" type="datetimeFigureOut">
               <a:rPr lang="fi-FI" smtClean="0"/>
-              <a:t>10.4.2016</a:t>
+              <a:t>11.4.2016</a:t>
             </a:fld>
             <a:endParaRPr lang="fi-FI"/>
           </a:p>
@@ -1325,7 +1325,7 @@
           <a:p>
             <a:fld id="{755046C0-CD55-4C47-BE07-7B297E1EF784}" type="datetimeFigureOut">
               <a:rPr lang="fi-FI" smtClean="0"/>
-              <a:t>10.4.2016</a:t>
+              <a:t>11.4.2016</a:t>
             </a:fld>
             <a:endParaRPr lang="fi-FI"/>
           </a:p>
@@ -1600,7 +1600,7 @@
           <a:p>
             <a:fld id="{755046C0-CD55-4C47-BE07-7B297E1EF784}" type="datetimeFigureOut">
               <a:rPr lang="fi-FI" smtClean="0"/>
-              <a:t>10.4.2016</a:t>
+              <a:t>11.4.2016</a:t>
             </a:fld>
             <a:endParaRPr lang="fi-FI"/>
           </a:p>
@@ -1979,7 +1979,7 @@
           <a:p>
             <a:fld id="{755046C0-CD55-4C47-BE07-7B297E1EF784}" type="datetimeFigureOut">
               <a:rPr lang="fi-FI" smtClean="0"/>
-              <a:t>10.4.2016</a:t>
+              <a:t>11.4.2016</a:t>
             </a:fld>
             <a:endParaRPr lang="fi-FI"/>
           </a:p>
@@ -2097,7 +2097,7 @@
           <a:p>
             <a:fld id="{755046C0-CD55-4C47-BE07-7B297E1EF784}" type="datetimeFigureOut">
               <a:rPr lang="fi-FI" smtClean="0"/>
-              <a:t>10.4.2016</a:t>
+              <a:t>11.4.2016</a:t>
             </a:fld>
             <a:endParaRPr lang="fi-FI"/>
           </a:p>
@@ -2268,7 +2268,7 @@
           <a:p>
             <a:fld id="{755046C0-CD55-4C47-BE07-7B297E1EF784}" type="datetimeFigureOut">
               <a:rPr lang="fi-FI" smtClean="0"/>
-              <a:t>10.4.2016</a:t>
+              <a:t>11.4.2016</a:t>
             </a:fld>
             <a:endParaRPr lang="fi-FI"/>
           </a:p>
@@ -2622,7 +2622,7 @@
           <a:p>
             <a:fld id="{755046C0-CD55-4C47-BE07-7B297E1EF784}" type="datetimeFigureOut">
               <a:rPr lang="fi-FI" smtClean="0"/>
-              <a:t>10.4.2016</a:t>
+              <a:t>11.4.2016</a:t>
             </a:fld>
             <a:endParaRPr lang="fi-FI"/>
           </a:p>
@@ -3004,7 +3004,7 @@
           <a:p>
             <a:fld id="{755046C0-CD55-4C47-BE07-7B297E1EF784}" type="datetimeFigureOut">
               <a:rPr lang="fi-FI" smtClean="0"/>
-              <a:t>10.4.2016</a:t>
+              <a:t>11.4.2016</a:t>
             </a:fld>
             <a:endParaRPr lang="fi-FI"/>
           </a:p>
@@ -3291,7 +3291,7 @@
           <a:p>
             <a:fld id="{755046C0-CD55-4C47-BE07-7B297E1EF784}" type="datetimeFigureOut">
               <a:rPr lang="fi-FI" smtClean="0"/>
-              <a:t>10.4.2016</a:t>
+              <a:t>11.4.2016</a:t>
             </a:fld>
             <a:endParaRPr lang="fi-FI"/>
           </a:p>
@@ -4465,6 +4465,30 @@
           </a:p>
         </p:txBody>
       </p:sp>
+      <p:pic>
+        <p:nvPicPr>
+          <p:cNvPr id="5" name="Kuva 4"/>
+          <p:cNvPicPr>
+            <a:picLocks noChangeAspect="1"/>
+          </p:cNvPicPr>
+          <p:nvPr/>
+        </p:nvPicPr>
+        <p:blipFill>
+          <a:blip r:embed="rId2"/>
+          <a:stretch>
+            <a:fillRect/>
+          </a:stretch>
+        </p:blipFill>
+        <p:spPr>
+          <a:xfrm>
+            <a:off x="2479124" y="2408930"/>
+            <a:ext cx="7439025" cy="3543300"/>
+          </a:xfrm>
+          <a:prstGeom prst="rect">
+            <a:avLst/>
+          </a:prstGeom>
+        </p:spPr>
+      </p:pic>
     </p:spTree>
     <p:extLst>
       <p:ext uri="{BB962C8B-B14F-4D97-AF65-F5344CB8AC3E}">

</xml_diff>